<commit_message>
Completed new masters (mostly)
</commit_message>
<xml_diff>
--- a/doc/Keeping up with Rachel Appel and the Commodore.pptx
+++ b/doc/Keeping up with Rachel Appel and the Commodore.pptx
@@ -3705,6 +3705,285 @@
     <p:extLst>
       <p:ext uri="{BB962C8B-B14F-4D97-AF65-F5344CB8AC3E}">
         <p14:creationId xmlns:p14="http://schemas.microsoft.com/office/powerpoint/2010/main" val="4276259984"/>
+      </p:ext>
+    </p:extLst>
+  </p:cSld>
+  <p:clrMapOvr>
+    <a:masterClrMapping/>
+  </p:clrMapOvr>
+</p:sldLayout>
+</file>
+
+<file path=ppt/slideLayouts/slideLayout18.xml><?xml version="1.0" encoding="utf-8"?>
+<p:sldLayout xmlns:a="http://schemas.openxmlformats.org/drawingml/2006/main" xmlns:r="http://schemas.openxmlformats.org/officeDocument/2006/relationships" xmlns:p="http://schemas.openxmlformats.org/presentationml/2006/main" preserve="1" userDrawn="1">
+  <p:cSld name="Blank">
+    <p:spTree>
+      <p:nvGrpSpPr>
+        <p:cNvPr id="1" name=""/>
+        <p:cNvGrpSpPr/>
+        <p:nvPr/>
+      </p:nvGrpSpPr>
+      <p:grpSpPr>
+        <a:xfrm>
+          <a:off x="0" y="0"/>
+          <a:ext cx="0" cy="0"/>
+          <a:chOff x="0" y="0"/>
+          <a:chExt cx="0" cy="0"/>
+        </a:xfrm>
+      </p:grpSpPr>
+    </p:spTree>
+    <p:extLst>
+      <p:ext uri="{BB962C8B-B14F-4D97-AF65-F5344CB8AC3E}">
+        <p14:creationId xmlns:p14="http://schemas.microsoft.com/office/powerpoint/2010/main" val="31661760"/>
+      </p:ext>
+    </p:extLst>
+  </p:cSld>
+  <p:clrMapOvr>
+    <a:masterClrMapping/>
+  </p:clrMapOvr>
+</p:sldLayout>
+</file>
+
+<file path=ppt/slideLayouts/slideLayout19.xml><?xml version="1.0" encoding="utf-8"?>
+<p:sldLayout xmlns:a="http://schemas.openxmlformats.org/drawingml/2006/main" xmlns:r="http://schemas.openxmlformats.org/officeDocument/2006/relationships" xmlns:p="http://schemas.openxmlformats.org/presentationml/2006/main" preserve="1" userDrawn="1">
+  <p:cSld name="Commodore 64">
+    <p:spTree>
+      <p:nvGrpSpPr>
+        <p:cNvPr id="1" name=""/>
+        <p:cNvGrpSpPr/>
+        <p:nvPr/>
+      </p:nvGrpSpPr>
+      <p:grpSpPr>
+        <a:xfrm>
+          <a:off x="0" y="0"/>
+          <a:ext cx="0" cy="0"/>
+          <a:chOff x="0" y="0"/>
+          <a:chExt cx="0" cy="0"/>
+        </a:xfrm>
+      </p:grpSpPr>
+      <p:sp>
+        <p:nvSpPr>
+          <p:cNvPr id="6" name="Text Placeholder 5">
+            <a:extLst>
+              <a:ext uri="{FF2B5EF4-FFF2-40B4-BE49-F238E27FC236}">
+                <a16:creationId xmlns:a16="http://schemas.microsoft.com/office/drawing/2014/main" id="{2E243F1D-FFEE-3B1B-08C5-94BC102943BB}"/>
+              </a:ext>
+            </a:extLst>
+          </p:cNvPr>
+          <p:cNvSpPr>
+            <a:spLocks noGrp="1"/>
+          </p:cNvSpPr>
+          <p:nvPr>
+            <p:ph type="body" sz="quarter" idx="10" hasCustomPrompt="1"/>
+          </p:nvPr>
+        </p:nvSpPr>
+        <p:spPr>
+          <a:xfrm>
+            <a:off x="2197100" y="832628"/>
+            <a:ext cx="7786655" cy="5192744"/>
+          </a:xfrm>
+          <a:prstGeom prst="rect">
+            <a:avLst/>
+          </a:prstGeom>
+        </p:spPr>
+        <p:txBody>
+          <a:bodyPr wrap="none"/>
+          <a:lstStyle>
+            <a:lvl1pPr marL="0" indent="0">
+              <a:lnSpc>
+                <a:spcPct val="88000"/>
+              </a:lnSpc>
+              <a:spcBef>
+                <a:spcPts val="0"/>
+              </a:spcBef>
+              <a:buNone/>
+              <a:defRPr sz="1500" baseline="0">
+                <a:latin typeface="C64 Pro Mono" panose="02010609060202080101" pitchFamily="49" charset="77"/>
+              </a:defRPr>
+            </a:lvl1pPr>
+          </a:lstStyle>
+          <a:p>
+            <a:pPr lvl="0"/>
+            <a:r>
+              <a:rPr lang="en-US" dirty="0"/>
+              <a:t>Û12345678901234567890123456789012345678Û</a:t>
+            </a:r>
+          </a:p>
+          <a:p>
+            <a:pPr lvl="0"/>
+            <a:r>
+              <a:rPr lang="en-US" dirty="0"/>
+              <a:t>1</a:t>
+            </a:r>
+          </a:p>
+          <a:p>
+            <a:pPr lvl="0"/>
+            <a:r>
+              <a:rPr lang="en-US" dirty="0"/>
+              <a:t>2</a:t>
+            </a:r>
+          </a:p>
+          <a:p>
+            <a:pPr lvl="0"/>
+            <a:r>
+              <a:rPr lang="en-US" dirty="0"/>
+              <a:t>3</a:t>
+            </a:r>
+          </a:p>
+          <a:p>
+            <a:pPr lvl="0"/>
+            <a:r>
+              <a:rPr lang="en-US" dirty="0"/>
+              <a:t>4</a:t>
+            </a:r>
+          </a:p>
+          <a:p>
+            <a:pPr lvl="0"/>
+            <a:r>
+              <a:rPr lang="en-US" dirty="0"/>
+              <a:t>5</a:t>
+            </a:r>
+          </a:p>
+          <a:p>
+            <a:pPr lvl="0"/>
+            <a:r>
+              <a:rPr lang="en-US" dirty="0"/>
+              <a:t>6</a:t>
+            </a:r>
+          </a:p>
+          <a:p>
+            <a:pPr lvl="0"/>
+            <a:r>
+              <a:rPr lang="en-US" dirty="0"/>
+              <a:t>7</a:t>
+            </a:r>
+          </a:p>
+          <a:p>
+            <a:pPr lvl="0"/>
+            <a:r>
+              <a:rPr lang="en-US" dirty="0"/>
+              <a:t>8</a:t>
+            </a:r>
+          </a:p>
+          <a:p>
+            <a:pPr lvl="0"/>
+            <a:r>
+              <a:rPr lang="en-US" dirty="0"/>
+              <a:t>9</a:t>
+            </a:r>
+          </a:p>
+          <a:p>
+            <a:pPr lvl="0"/>
+            <a:r>
+              <a:rPr lang="en-US" dirty="0"/>
+              <a:t>0</a:t>
+            </a:r>
+          </a:p>
+          <a:p>
+            <a:pPr lvl="0"/>
+            <a:r>
+              <a:rPr lang="en-US" dirty="0"/>
+              <a:t>1</a:t>
+            </a:r>
+          </a:p>
+          <a:p>
+            <a:pPr lvl="0"/>
+            <a:r>
+              <a:rPr lang="en-US" dirty="0"/>
+              <a:t>2</a:t>
+            </a:r>
+          </a:p>
+          <a:p>
+            <a:pPr lvl="0"/>
+            <a:r>
+              <a:rPr lang="en-US" dirty="0"/>
+              <a:t>3</a:t>
+            </a:r>
+          </a:p>
+          <a:p>
+            <a:pPr lvl="0"/>
+            <a:r>
+              <a:rPr lang="en-US" dirty="0"/>
+              <a:t>4</a:t>
+            </a:r>
+          </a:p>
+          <a:p>
+            <a:pPr lvl="0"/>
+            <a:r>
+              <a:rPr lang="en-US" dirty="0"/>
+              <a:t>5</a:t>
+            </a:r>
+          </a:p>
+          <a:p>
+            <a:pPr lvl="0"/>
+            <a:r>
+              <a:rPr lang="en-US" dirty="0"/>
+              <a:t>6</a:t>
+            </a:r>
+          </a:p>
+          <a:p>
+            <a:pPr lvl="0"/>
+            <a:r>
+              <a:rPr lang="en-US" dirty="0"/>
+              <a:t>7</a:t>
+            </a:r>
+          </a:p>
+          <a:p>
+            <a:pPr lvl="0"/>
+            <a:r>
+              <a:rPr lang="en-US" dirty="0"/>
+              <a:t>8</a:t>
+            </a:r>
+          </a:p>
+          <a:p>
+            <a:pPr lvl="0"/>
+            <a:r>
+              <a:rPr lang="en-US" dirty="0"/>
+              <a:t>9</a:t>
+            </a:r>
+          </a:p>
+          <a:p>
+            <a:pPr lvl="0"/>
+            <a:r>
+              <a:rPr lang="en-US" dirty="0"/>
+              <a:t>0</a:t>
+            </a:r>
+          </a:p>
+          <a:p>
+            <a:pPr lvl="0"/>
+            <a:r>
+              <a:rPr lang="en-US" dirty="0"/>
+              <a:t>1</a:t>
+            </a:r>
+          </a:p>
+          <a:p>
+            <a:pPr lvl="0"/>
+            <a:r>
+              <a:rPr lang="en-US" dirty="0"/>
+              <a:t>2</a:t>
+            </a:r>
+          </a:p>
+          <a:p>
+            <a:pPr lvl="0"/>
+            <a:r>
+              <a:rPr lang="en-US" dirty="0"/>
+              <a:t>3</a:t>
+            </a:r>
+          </a:p>
+          <a:p>
+            <a:pPr lvl="0"/>
+            <a:r>
+              <a:rPr lang="en-US" dirty="0" err="1"/>
+              <a:t>Û</a:t>
+            </a:r>
+            <a:endParaRPr lang="en-US" dirty="0"/>
+          </a:p>
+        </p:txBody>
+      </p:sp>
+    </p:spTree>
+    <p:extLst>
+      <p:ext uri="{BB962C8B-B14F-4D97-AF65-F5344CB8AC3E}">
+        <p14:creationId xmlns:p14="http://schemas.microsoft.com/office/powerpoint/2010/main" val="2716161086"/>
       </p:ext>
     </p:extLst>
   </p:cSld>
@@ -6546,6 +6825,9 @@
     </p:extLst>
   </p:cSld>
   <p:clrMap bg1="lt1" tx1="dk1" bg2="lt2" tx2="dk2" accent1="accent1" accent2="accent2" accent3="accent3" accent4="accent4" accent5="accent5" accent6="accent6" hlink="hlink" folHlink="folHlink"/>
+  <p:sldLayoutIdLst>
+    <p:sldLayoutId id="2147483648" r:id="rId1"/>
+  </p:sldLayoutIdLst>
   <p:txStyles>
     <p:titleStyle>
       <a:lvl1pPr algn="l" defTabSz="914400" rtl="0" eaLnBrk="1" latinLnBrk="0" hangingPunct="1">
@@ -6835,7 +7117,7 @@
     <p:bg>
       <p:bgPr>
         <a:blipFill dpi="0" rotWithShape="1">
-          <a:blip r:embed="rId2">
+          <a:blip r:embed="rId3">
             <a:lum/>
           </a:blip>
           <a:srcRect/>
@@ -6868,6 +7150,9 @@
     </p:extLst>
   </p:cSld>
   <p:clrMap bg1="lt1" tx1="dk1" bg2="lt2" tx2="dk2" accent1="accent1" accent2="accent2" accent3="accent3" accent4="accent4" accent5="accent5" accent6="accent6" hlink="hlink" folHlink="folHlink"/>
+  <p:sldLayoutIdLst>
+    <p:sldLayoutId id="2147483680" r:id="rId1"/>
+  </p:sldLayoutIdLst>
   <p:txStyles>
     <p:titleStyle>
       <a:lvl1pPr algn="l" defTabSz="914400" rtl="0" eaLnBrk="1" latinLnBrk="0" hangingPunct="1">

</xml_diff>

<commit_message>
Fixed text color in slide master
</commit_message>
<xml_diff>
--- a/doc/Keeping up with Rachel Appel and the Commodore.pptx
+++ b/doc/Keeping up with Rachel Appel and the Commodore.pptx
@@ -3779,8 +3779,8 @@
         </p:nvSpPr>
         <p:spPr>
           <a:xfrm>
-            <a:off x="2197100" y="832628"/>
-            <a:ext cx="7786655" cy="5192744"/>
+            <a:off x="2197100" y="844550"/>
+            <a:ext cx="7788663" cy="5176448"/>
           </a:xfrm>
           <a:prstGeom prst="rect">
             <a:avLst/>
@@ -3798,6 +3798,9 @@
               </a:spcBef>
               <a:buNone/>
               <a:defRPr sz="1500" baseline="0">
+                <a:solidFill>
+                  <a:srgbClr val="7385FF"/>
+                </a:solidFill>
                 <a:latin typeface="C64 Pro Mono" panose="02010609060202080101" pitchFamily="49" charset="77"/>
               </a:defRPr>
             </a:lvl1pPr>

</xml_diff>

<commit_message>
Second C64-style cover added
</commit_message>
<xml_diff>
--- a/doc/Keeping up with Rachel Appel and the Commodore.pptx
+++ b/doc/Keeping up with Rachel Appel and the Commodore.pptx
@@ -7,12 +7,13 @@
     <p:sldMasterId id="2147483678" r:id="rId3"/>
   </p:sldMasterIdLst>
   <p:notesMasterIdLst>
-    <p:notesMasterId r:id="rId7"/>
+    <p:notesMasterId r:id="rId8"/>
   </p:notesMasterIdLst>
   <p:sldIdLst>
     <p:sldId id="256" r:id="rId4"/>
-    <p:sldId id="284" r:id="rId5"/>
-    <p:sldId id="321" r:id="rId6"/>
+    <p:sldId id="322" r:id="rId5"/>
+    <p:sldId id="284" r:id="rId6"/>
+    <p:sldId id="321" r:id="rId7"/>
   </p:sldIdLst>
   <p:sldSz cx="12192000" cy="6858000"/>
   <p:notesSz cx="6858000" cy="9144000"/>
@@ -543,6 +544,90 @@
     <p:extLst>
       <p:ext uri="{BB962C8B-B14F-4D97-AF65-F5344CB8AC3E}">
         <p14:creationId xmlns:p14="http://schemas.microsoft.com/office/powerpoint/2010/main" val="2706683152"/>
+      </p:ext>
+    </p:extLst>
+  </p:cSld>
+  <p:clrMapOvr>
+    <a:masterClrMapping/>
+  </p:clrMapOvr>
+</p:notes>
+</file>
+
+<file path=ppt/notesSlides/notesSlide2.xml><?xml version="1.0" encoding="utf-8"?>
+<p:notes xmlns:a="http://schemas.openxmlformats.org/drawingml/2006/main" xmlns:r="http://schemas.openxmlformats.org/officeDocument/2006/relationships" xmlns:p="http://schemas.openxmlformats.org/presentationml/2006/main">
+  <p:cSld>
+    <p:spTree>
+      <p:nvGrpSpPr>
+        <p:cNvPr id="1" name=""/>
+        <p:cNvGrpSpPr/>
+        <p:nvPr/>
+      </p:nvGrpSpPr>
+      <p:grpSpPr>
+        <a:xfrm>
+          <a:off x="0" y="0"/>
+          <a:ext cx="0" cy="0"/>
+          <a:chOff x="0" y="0"/>
+          <a:chExt cx="0" cy="0"/>
+        </a:xfrm>
+      </p:grpSpPr>
+      <p:sp>
+        <p:nvSpPr>
+          <p:cNvPr id="2" name="Slide Image Placeholder 1"/>
+          <p:cNvSpPr>
+            <a:spLocks noGrp="1" noRot="1" noChangeAspect="1"/>
+          </p:cNvSpPr>
+          <p:nvPr>
+            <p:ph type="sldImg"/>
+          </p:nvPr>
+        </p:nvSpPr>
+        <p:spPr/>
+      </p:sp>
+      <p:sp>
+        <p:nvSpPr>
+          <p:cNvPr id="3" name="Notes Placeholder 2"/>
+          <p:cNvSpPr>
+            <a:spLocks noGrp="1"/>
+          </p:cNvSpPr>
+          <p:nvPr>
+            <p:ph type="body" idx="1"/>
+          </p:nvPr>
+        </p:nvSpPr>
+        <p:spPr/>
+        <p:txBody>
+          <a:bodyPr/>
+          <a:lstStyle/>
+          <a:p>
+            <a:endParaRPr lang="en-US" dirty="0"/>
+          </a:p>
+        </p:txBody>
+      </p:sp>
+      <p:sp>
+        <p:nvSpPr>
+          <p:cNvPr id="4" name="Slide Number Placeholder 3"/>
+          <p:cNvSpPr>
+            <a:spLocks noGrp="1"/>
+          </p:cNvSpPr>
+          <p:nvPr>
+            <p:ph type="sldNum" sz="quarter" idx="5"/>
+          </p:nvPr>
+        </p:nvSpPr>
+        <p:spPr/>
+        <p:txBody>
+          <a:bodyPr/>
+          <a:lstStyle/>
+          <a:p>
+            <a:fld id="{2B4F40D4-862D-491C-85E3-1A34EFA2BD00}" type="slidenum">
+              <a:rPr lang="en-US" smtClean="0"/>
+              <a:t>2</a:t>
+            </a:fld>
+            <a:endParaRPr lang="en-US"/>
+          </a:p>
+        </p:txBody>
+      </p:sp>
+    </p:spTree>
+    <p:extLst>
+      <p:ext uri="{BB962C8B-B14F-4D97-AF65-F5344CB8AC3E}">
+        <p14:creationId xmlns:p14="http://schemas.microsoft.com/office/powerpoint/2010/main" val="734100875"/>
       </p:ext>
     </p:extLst>
   </p:cSld>
@@ -8097,6 +8182,157 @@
       </p:grpSpPr>
       <p:sp>
         <p:nvSpPr>
+          <p:cNvPr id="2" name="Text Placeholder 1">
+            <a:extLst>
+              <a:ext uri="{FF2B5EF4-FFF2-40B4-BE49-F238E27FC236}">
+                <a16:creationId xmlns:a16="http://schemas.microsoft.com/office/drawing/2014/main" id="{EADA3337-D615-36C5-1A8A-4AB9ACC7C018}"/>
+              </a:ext>
+            </a:extLst>
+          </p:cNvPr>
+          <p:cNvSpPr>
+            <a:spLocks noGrp="1"/>
+          </p:cNvSpPr>
+          <p:nvPr>
+            <p:ph type="body" sz="quarter" idx="10"/>
+          </p:nvPr>
+        </p:nvSpPr>
+        <p:spPr/>
+        <p:txBody>
+          <a:bodyPr/>
+          <a:lstStyle/>
+          <a:p>
+            <a:endParaRPr lang="en-US" dirty="0"/>
+          </a:p>
+          <a:p>
+            <a:r>
+              <a:rPr lang="en-US" dirty="0"/>
+              <a:t>    **** COMMODORE 64 BASIC V2 ****</a:t>
+            </a:r>
+          </a:p>
+          <a:p>
+            <a:endParaRPr lang="en-US" dirty="0"/>
+          </a:p>
+          <a:p>
+            <a:r>
+              <a:rPr lang="en-US" dirty="0"/>
+              <a:t> 64K RAM SYSTEM  38911 BASIC BYTES FREE</a:t>
+            </a:r>
+          </a:p>
+          <a:p>
+            <a:endParaRPr lang="en-US" dirty="0"/>
+          </a:p>
+          <a:p>
+            <a:r>
+              <a:rPr lang="en-US" dirty="0"/>
+              <a:t>READY.</a:t>
+            </a:r>
+          </a:p>
+          <a:p>
+            <a:endParaRPr lang="en-US" dirty="0"/>
+          </a:p>
+          <a:p>
+            <a:endParaRPr lang="en-US" dirty="0"/>
+          </a:p>
+          <a:p>
+            <a:endParaRPr lang="en-US" dirty="0"/>
+          </a:p>
+          <a:p>
+            <a:r>
+              <a:rPr lang="en-US" dirty="0"/>
+              <a:t>        KEEPING UP WITH RACHEL</a:t>
+            </a:r>
+          </a:p>
+          <a:p>
+            <a:r>
+              <a:rPr lang="en-US" dirty="0"/>
+              <a:t>        APPEL AND THE COMMODORE</a:t>
+            </a:r>
+          </a:p>
+          <a:p>
+            <a:endParaRPr lang="en-US" dirty="0"/>
+          </a:p>
+          <a:p>
+            <a:endParaRPr lang="en-US" dirty="0"/>
+          </a:p>
+          <a:p>
+            <a:endParaRPr lang="en-US" dirty="0"/>
+          </a:p>
+          <a:p>
+            <a:endParaRPr lang="en-US" dirty="0"/>
+          </a:p>
+          <a:p>
+            <a:endParaRPr lang="en-US" dirty="0"/>
+          </a:p>
+          <a:p>
+            <a:endParaRPr lang="en-US" dirty="0"/>
+          </a:p>
+          <a:p>
+            <a:endParaRPr lang="en-US" dirty="0"/>
+          </a:p>
+          <a:p>
+            <a:endParaRPr lang="en-US" dirty="0"/>
+          </a:p>
+          <a:p>
+            <a:endParaRPr lang="en-US" dirty="0"/>
+          </a:p>
+          <a:p>
+            <a:endParaRPr lang="en-US" dirty="0"/>
+          </a:p>
+          <a:p>
+            <a:r>
+              <a:rPr lang="en-US" dirty="0"/>
+              <a:t>DENNIS DIETRICH</a:t>
+            </a:r>
+          </a:p>
+          <a:p>
+            <a:endParaRPr lang="en-US" dirty="0"/>
+          </a:p>
+          <a:p>
+            <a:r>
+              <a:rPr lang="en-US" dirty="0"/>
+              <a:t>MANAGER SOFTWARE DEVELOPMENT ICS</a:t>
+            </a:r>
+          </a:p>
+          <a:p>
+            <a:r>
+              <a:rPr lang="en-US" dirty="0"/>
+              <a:t>PHOENIX CONTACT</a:t>
+            </a:r>
+          </a:p>
+        </p:txBody>
+      </p:sp>
+    </p:spTree>
+    <p:extLst>
+      <p:ext uri="{BB962C8B-B14F-4D97-AF65-F5344CB8AC3E}">
+        <p14:creationId xmlns:p14="http://schemas.microsoft.com/office/powerpoint/2010/main" val="3271121188"/>
+      </p:ext>
+    </p:extLst>
+  </p:cSld>
+  <p:clrMapOvr>
+    <a:masterClrMapping/>
+  </p:clrMapOvr>
+</p:sld>
+</file>
+
+<file path=ppt/slides/slide3.xml><?xml version="1.0" encoding="utf-8"?>
+<p:sld xmlns:a="http://schemas.openxmlformats.org/drawingml/2006/main" xmlns:r="http://schemas.openxmlformats.org/officeDocument/2006/relationships" xmlns:p="http://schemas.openxmlformats.org/presentationml/2006/main">
+  <p:cSld>
+    <p:spTree>
+      <p:nvGrpSpPr>
+        <p:cNvPr id="1" name=""/>
+        <p:cNvGrpSpPr/>
+        <p:nvPr/>
+      </p:nvGrpSpPr>
+      <p:grpSpPr>
+        <a:xfrm>
+          <a:off x="0" y="0"/>
+          <a:ext cx="0" cy="0"/>
+          <a:chOff x="0" y="0"/>
+          <a:chExt cx="0" cy="0"/>
+        </a:xfrm>
+      </p:grpSpPr>
+      <p:sp>
+        <p:nvSpPr>
           <p:cNvPr id="2" name="Title 1">
             <a:extLst>
               <a:ext uri="{FF2B5EF4-FFF2-40B4-BE49-F238E27FC236}">
@@ -8403,7 +8639,7 @@
 </p:sld>
 </file>
 
-<file path=ppt/slides/slide3.xml><?xml version="1.0" encoding="utf-8"?>
+<file path=ppt/slides/slide4.xml><?xml version="1.0" encoding="utf-8"?>
 <p:sld xmlns:a="http://schemas.openxmlformats.org/drawingml/2006/main" xmlns:r="http://schemas.openxmlformats.org/officeDocument/2006/relationships" xmlns:p="http://schemas.openxmlformats.org/presentationml/2006/main">
   <p:cSld>
     <p:spTree>

</xml_diff>

<commit_message>
Defined colors (except for hyperlinks)
</commit_message>
<xml_diff>
--- a/doc/Keeping up with Rachel Appel and the Commodore.pptx
+++ b/doc/Keeping up with Rachel Appel and the Commodore.pptx
@@ -201,7 +201,7 @@
           <a:p>
             <a:fld id="{2B6DBF41-98D5-4B29-8B81-B31614D19ACC}" type="datetimeFigureOut">
               <a:rPr lang="en-US" smtClean="0"/>
-              <a:t>8/29/24</a:t>
+              <a:t>8/30/24</a:t>
             </a:fld>
             <a:endParaRPr lang="en-US"/>
           </a:p>
@@ -821,7 +821,7 @@
           <a:p>
             <a:fld id="{F9BC75CE-03FF-4667-898C-4C70B4392062}" type="datetimeFigureOut">
               <a:rPr lang="en-US" smtClean="0"/>
-              <a:t>8/29/24</a:t>
+              <a:t>8/30/24</a:t>
             </a:fld>
             <a:endParaRPr lang="en-US"/>
           </a:p>
@@ -1096,7 +1096,7 @@
           <a:p>
             <a:fld id="{F9BC75CE-03FF-4667-898C-4C70B4392062}" type="datetimeFigureOut">
               <a:rPr lang="en-US" smtClean="0"/>
-              <a:t>8/29/24</a:t>
+              <a:t>8/30/24</a:t>
             </a:fld>
             <a:endParaRPr lang="en-US"/>
           </a:p>
@@ -1290,7 +1290,7 @@
           <a:p>
             <a:fld id="{F9BC75CE-03FF-4667-898C-4C70B4392062}" type="datetimeFigureOut">
               <a:rPr lang="en-US" smtClean="0"/>
-              <a:t>8/29/24</a:t>
+              <a:t>8/30/24</a:t>
             </a:fld>
             <a:endParaRPr lang="en-US"/>
           </a:p>
@@ -1563,7 +1563,7 @@
           <a:p>
             <a:fld id="{F9BC75CE-03FF-4667-898C-4C70B4392062}" type="datetimeFigureOut">
               <a:rPr lang="en-US" smtClean="0"/>
-              <a:t>8/29/24</a:t>
+              <a:t>8/30/24</a:t>
             </a:fld>
             <a:endParaRPr lang="en-US"/>
           </a:p>
@@ -1904,7 +1904,7 @@
           <a:p>
             <a:fld id="{F9BC75CE-03FF-4667-898C-4C70B4392062}" type="datetimeFigureOut">
               <a:rPr lang="en-US" smtClean="0"/>
-              <a:t>8/29/24</a:t>
+              <a:t>8/30/24</a:t>
             </a:fld>
             <a:endParaRPr lang="en-US"/>
           </a:p>
@@ -2527,7 +2527,7 @@
           <a:p>
             <a:fld id="{F9BC75CE-03FF-4667-898C-4C70B4392062}" type="datetimeFigureOut">
               <a:rPr lang="en-US" smtClean="0"/>
-              <a:t>8/29/24</a:t>
+              <a:t>8/30/24</a:t>
             </a:fld>
             <a:endParaRPr lang="en-US"/>
           </a:p>
@@ -3387,7 +3387,7 @@
           <a:p>
             <a:fld id="{F9BC75CE-03FF-4667-898C-4C70B4392062}" type="datetimeFigureOut">
               <a:rPr lang="en-US" smtClean="0"/>
-              <a:t>8/29/24</a:t>
+              <a:t>8/30/24</a:t>
             </a:fld>
             <a:endParaRPr lang="en-US"/>
           </a:p>
@@ -3557,7 +3557,7 @@
           <a:p>
             <a:fld id="{F9BC75CE-03FF-4667-898C-4C70B4392062}" type="datetimeFigureOut">
               <a:rPr lang="en-US" smtClean="0"/>
-              <a:t>8/29/24</a:t>
+              <a:t>8/30/24</a:t>
             </a:fld>
             <a:endParaRPr lang="en-US"/>
           </a:p>
@@ -3737,7 +3737,7 @@
           <a:p>
             <a:fld id="{F9BC75CE-03FF-4667-898C-4C70B4392062}" type="datetimeFigureOut">
               <a:rPr lang="en-US" smtClean="0"/>
-              <a:t>8/29/24</a:t>
+              <a:t>8/30/24</a:t>
             </a:fld>
             <a:endParaRPr lang="en-US"/>
           </a:p>
@@ -4189,7 +4189,7 @@
           <a:p>
             <a:fld id="{F9BC75CE-03FF-4667-898C-4C70B4392062}" type="datetimeFigureOut">
               <a:rPr lang="en-US" smtClean="0"/>
-              <a:t>8/29/24</a:t>
+              <a:t>8/30/24</a:t>
             </a:fld>
             <a:endParaRPr lang="en-US"/>
           </a:p>
@@ -4436,7 +4436,7 @@
           <a:p>
             <a:fld id="{F9BC75CE-03FF-4667-898C-4C70B4392062}" type="datetimeFigureOut">
               <a:rPr lang="en-US" smtClean="0"/>
-              <a:t>8/29/24</a:t>
+              <a:t>8/30/24</a:t>
             </a:fld>
             <a:endParaRPr lang="en-US"/>
           </a:p>
@@ -4728,7 +4728,7 @@
           <a:p>
             <a:fld id="{F9BC75CE-03FF-4667-898C-4C70B4392062}" type="datetimeFigureOut">
               <a:rPr lang="en-US" smtClean="0"/>
-              <a:t>8/29/24</a:t>
+              <a:t>8/30/24</a:t>
             </a:fld>
             <a:endParaRPr lang="en-US"/>
           </a:p>
@@ -5172,7 +5172,7 @@
           <a:p>
             <a:fld id="{F9BC75CE-03FF-4667-898C-4C70B4392062}" type="datetimeFigureOut">
               <a:rPr lang="en-US" smtClean="0"/>
-              <a:t>8/29/24</a:t>
+              <a:t>8/30/24</a:t>
             </a:fld>
             <a:endParaRPr lang="en-US"/>
           </a:p>
@@ -5290,7 +5290,7 @@
           <a:p>
             <a:fld id="{F9BC75CE-03FF-4667-898C-4C70B4392062}" type="datetimeFigureOut">
               <a:rPr lang="en-US" smtClean="0"/>
-              <a:t>8/29/24</a:t>
+              <a:t>8/30/24</a:t>
             </a:fld>
             <a:endParaRPr lang="en-US"/>
           </a:p>
@@ -5385,7 +5385,7 @@
           <a:p>
             <a:fld id="{F9BC75CE-03FF-4667-898C-4C70B4392062}" type="datetimeFigureOut">
               <a:rPr lang="en-US" smtClean="0"/>
-              <a:t>8/29/24</a:t>
+              <a:t>8/30/24</a:t>
             </a:fld>
             <a:endParaRPr lang="en-US"/>
           </a:p>
@@ -5664,7 +5664,7 @@
           <a:p>
             <a:fld id="{F9BC75CE-03FF-4667-898C-4C70B4392062}" type="datetimeFigureOut">
               <a:rPr lang="en-US" smtClean="0"/>
-              <a:t>8/29/24</a:t>
+              <a:t>8/30/24</a:t>
             </a:fld>
             <a:endParaRPr lang="en-US"/>
           </a:p>
@@ -5939,7 +5939,7 @@
           <a:p>
             <a:fld id="{F9BC75CE-03FF-4667-898C-4C70B4392062}" type="datetimeFigureOut">
               <a:rPr lang="en-US" smtClean="0"/>
-              <a:t>8/29/24</a:t>
+              <a:t>8/30/24</a:t>
             </a:fld>
             <a:endParaRPr lang="en-US"/>
           </a:p>
@@ -6368,7 +6368,7 @@
           <a:p>
             <a:fld id="{F9BC75CE-03FF-4667-898C-4C70B4392062}" type="datetimeFigureOut">
               <a:rPr lang="en-US" smtClean="0"/>
-              <a:t>8/29/24</a:t>
+              <a:t>8/30/24</a:t>
             </a:fld>
             <a:endParaRPr lang="en-US"/>
           </a:p>
@@ -9440,36 +9440,36 @@
 <file path=ppt/theme/theme3.xml><?xml version="1.0" encoding="utf-8"?>
 <a:theme xmlns:a="http://schemas.openxmlformats.org/drawingml/2006/main" name="Commodore 64">
   <a:themeElements>
-    <a:clrScheme name="Office">
+    <a:clrScheme name="Commodore 64">
       <a:dk1>
-        <a:sysClr val="windowText" lastClr="000000"/>
+        <a:srgbClr val="7385FF"/>
       </a:dk1>
       <a:lt1>
-        <a:sysClr val="window" lastClr="FFFFFF"/>
+        <a:srgbClr val="FFFFFF"/>
       </a:lt1>
       <a:dk2>
-        <a:srgbClr val="0E2841"/>
+        <a:srgbClr val="000000"/>
       </a:dk2>
       <a:lt2>
-        <a:srgbClr val="E8E8E8"/>
+        <a:srgbClr val="2C3CEC"/>
       </a:lt2>
       <a:accent1>
-        <a:srgbClr val="156082"/>
+        <a:srgbClr val="AF3C58"/>
       </a:accent1>
       <a:accent2>
-        <a:srgbClr val="E97132"/>
+        <a:srgbClr val="7EF3D6"/>
       </a:accent2>
       <a:accent3>
-        <a:srgbClr val="196B24"/>
+        <a:srgbClr val="AA40F5"/>
       </a:accent3>
       <a:accent4>
-        <a:srgbClr val="0F9ED5"/>
+        <a:srgbClr val="61D532"/>
       </a:accent4>
       <a:accent5>
-        <a:srgbClr val="A02B93"/>
+        <a:srgbClr val="FFFF46"/>
       </a:accent5>
       <a:accent6>
-        <a:srgbClr val="4EA72E"/>
+        <a:srgbClr val="B7FF86"/>
       </a:accent6>
       <a:hlink>
         <a:srgbClr val="467886"/>

</xml_diff>

<commit_message>
Added portrait and book cover
</commit_message>
<xml_diff>
--- a/doc/Keeping up with Rachel Appel and the Commodore.pptx
+++ b/doc/Keeping up with Rachel Appel and the Commodore.pptx
@@ -8368,6 +8368,102 @@
           </a:p>
         </p:txBody>
       </p:sp>
+      <p:pic>
+        <p:nvPicPr>
+          <p:cNvPr id="4" name="Picture 3" descr="Pixelated portrait of Rachel Appel">
+            <a:extLst>
+              <a:ext uri="{FF2B5EF4-FFF2-40B4-BE49-F238E27FC236}">
+                <a16:creationId xmlns:a16="http://schemas.microsoft.com/office/drawing/2014/main" id="{D97BDFFB-81D7-33F2-A623-49CAE8092B71}"/>
+              </a:ext>
+            </a:extLst>
+          </p:cNvPr>
+          <p:cNvPicPr>
+            <a:picLocks noChangeAspect="1"/>
+          </p:cNvPicPr>
+          <p:nvPr/>
+        </p:nvPicPr>
+        <p:blipFill>
+          <a:blip r:embed="rId3">
+            <a:extLst>
+              <a:ext uri="{28A0092B-C50C-407E-A947-70E740481C1C}">
+                <a14:useLocalDpi xmlns:a14="http://schemas.microsoft.com/office/drawing/2010/main" val="0"/>
+              </a:ext>
+            </a:extLst>
+          </a:blip>
+          <a:stretch>
+            <a:fillRect/>
+          </a:stretch>
+        </p:blipFill>
+        <p:spPr>
+          <a:xfrm>
+            <a:off x="518602" y="506028"/>
+            <a:ext cx="3657600" cy="3657600"/>
+          </a:xfrm>
+          <a:prstGeom prst="rect">
+            <a:avLst/>
+          </a:prstGeom>
+          <a:ln w="25400">
+            <a:solidFill>
+              <a:schemeClr val="accent1"/>
+            </a:solidFill>
+          </a:ln>
+          <a:effectLst>
+            <a:outerShdw blurRad="127000" dist="127000" dir="2700000" algn="tl" rotWithShape="0">
+              <a:schemeClr val="tx2">
+                <a:alpha val="80000"/>
+              </a:schemeClr>
+            </a:outerShdw>
+          </a:effectLst>
+        </p:spPr>
+      </p:pic>
+      <p:pic>
+        <p:nvPicPr>
+          <p:cNvPr id="8" name="Picture 7" descr="Pixelated cover of ‘Artificial Intelligence Projects for the Commodore 64’ by Timothy J. O’Malley">
+            <a:extLst>
+              <a:ext uri="{FF2B5EF4-FFF2-40B4-BE49-F238E27FC236}">
+                <a16:creationId xmlns:a16="http://schemas.microsoft.com/office/drawing/2014/main" id="{7D5F7B0D-7636-A806-9236-041EB2DE615A}"/>
+              </a:ext>
+            </a:extLst>
+          </p:cNvPr>
+          <p:cNvPicPr>
+            <a:picLocks noChangeAspect="1"/>
+          </p:cNvPicPr>
+          <p:nvPr/>
+        </p:nvPicPr>
+        <p:blipFill>
+          <a:blip r:embed="rId4">
+            <a:extLst>
+              <a:ext uri="{28A0092B-C50C-407E-A947-70E740481C1C}">
+                <a14:useLocalDpi xmlns:a14="http://schemas.microsoft.com/office/drawing/2010/main" val="0"/>
+              </a:ext>
+            </a:extLst>
+          </a:blip>
+          <a:stretch>
+            <a:fillRect/>
+          </a:stretch>
+        </p:blipFill>
+        <p:spPr>
+          <a:xfrm>
+            <a:off x="7476348" y="1105481"/>
+            <a:ext cx="4267200" cy="5289550"/>
+          </a:xfrm>
+          <a:prstGeom prst="rect">
+            <a:avLst/>
+          </a:prstGeom>
+          <a:ln w="25400">
+            <a:solidFill>
+              <a:schemeClr val="accent1"/>
+            </a:solidFill>
+          </a:ln>
+          <a:effectLst>
+            <a:outerShdw blurRad="127000" dist="127000" dir="2700000" algn="tl" rotWithShape="0">
+              <a:schemeClr val="tx2">
+                <a:alpha val="80000"/>
+              </a:schemeClr>
+            </a:outerShdw>
+          </a:effectLst>
+        </p:spPr>
+      </p:pic>
     </p:spTree>
     <p:extLst>
       <p:ext uri="{BB962C8B-B14F-4D97-AF65-F5344CB8AC3E}">
@@ -8381,6 +8477,126 @@
   <p:transition>
     <p:dissolve/>
   </p:transition>
+  <p:timing>
+    <p:tnLst>
+      <p:par>
+        <p:cTn id="1" dur="indefinite" restart="never" nodeType="tmRoot">
+          <p:childTnLst>
+            <p:seq concurrent="1" nextAc="seek">
+              <p:cTn id="2" dur="indefinite" nodeType="mainSeq">
+                <p:childTnLst>
+                  <p:par>
+                    <p:cTn id="3" fill="hold">
+                      <p:stCondLst>
+                        <p:cond delay="indefinite"/>
+                      </p:stCondLst>
+                      <p:childTnLst>
+                        <p:par>
+                          <p:cTn id="4" fill="hold">
+                            <p:stCondLst>
+                              <p:cond delay="0"/>
+                            </p:stCondLst>
+                            <p:childTnLst>
+                              <p:par>
+                                <p:cTn id="5" presetID="1" presetClass="entr" presetSubtype="0" fill="hold" nodeType="clickEffect">
+                                  <p:stCondLst>
+                                    <p:cond delay="0"/>
+                                  </p:stCondLst>
+                                  <p:childTnLst>
+                                    <p:set>
+                                      <p:cBhvr>
+                                        <p:cTn id="6" dur="1" fill="hold">
+                                          <p:stCondLst>
+                                            <p:cond delay="0"/>
+                                          </p:stCondLst>
+                                        </p:cTn>
+                                        <p:tgtEl>
+                                          <p:spTgt spid="4"/>
+                                        </p:tgtEl>
+                                        <p:attrNameLst>
+                                          <p:attrName>style.visibility</p:attrName>
+                                        </p:attrNameLst>
+                                      </p:cBhvr>
+                                      <p:to>
+                                        <p:strVal val="visible"/>
+                                      </p:to>
+                                    </p:set>
+                                  </p:childTnLst>
+                                </p:cTn>
+                              </p:par>
+                            </p:childTnLst>
+                          </p:cTn>
+                        </p:par>
+                      </p:childTnLst>
+                    </p:cTn>
+                  </p:par>
+                  <p:par>
+                    <p:cTn id="7" fill="hold">
+                      <p:stCondLst>
+                        <p:cond delay="indefinite"/>
+                      </p:stCondLst>
+                      <p:childTnLst>
+                        <p:par>
+                          <p:cTn id="8" fill="hold">
+                            <p:stCondLst>
+                              <p:cond delay="0"/>
+                            </p:stCondLst>
+                            <p:childTnLst>
+                              <p:par>
+                                <p:cTn id="9" presetID="1" presetClass="entr" presetSubtype="0" fill="hold" nodeType="clickEffect">
+                                  <p:stCondLst>
+                                    <p:cond delay="0"/>
+                                  </p:stCondLst>
+                                  <p:childTnLst>
+                                    <p:set>
+                                      <p:cBhvr>
+                                        <p:cTn id="10" dur="1" fill="hold">
+                                          <p:stCondLst>
+                                            <p:cond delay="0"/>
+                                          </p:stCondLst>
+                                        </p:cTn>
+                                        <p:tgtEl>
+                                          <p:spTgt spid="8"/>
+                                        </p:tgtEl>
+                                        <p:attrNameLst>
+                                          <p:attrName>style.visibility</p:attrName>
+                                        </p:attrNameLst>
+                                      </p:cBhvr>
+                                      <p:to>
+                                        <p:strVal val="visible"/>
+                                      </p:to>
+                                    </p:set>
+                                  </p:childTnLst>
+                                </p:cTn>
+                              </p:par>
+                            </p:childTnLst>
+                          </p:cTn>
+                        </p:par>
+                      </p:childTnLst>
+                    </p:cTn>
+                  </p:par>
+                </p:childTnLst>
+              </p:cTn>
+              <p:prevCondLst>
+                <p:cond evt="onPrev" delay="0">
+                  <p:tgtEl>
+                    <p:sldTgt/>
+                  </p:tgtEl>
+                </p:cond>
+              </p:prevCondLst>
+              <p:nextCondLst>
+                <p:cond evt="onNext" delay="0">
+                  <p:tgtEl>
+                    <p:sldTgt/>
+                  </p:tgtEl>
+                </p:cond>
+              </p:nextCondLst>
+            </p:seq>
+          </p:childTnLst>
+        </p:cTn>
+      </p:par>
+    </p:tnLst>
+  </p:timing>
 </p:sld>
 </file>
 

</xml_diff>

<commit_message>
New slide master for "C64 Wide"
</commit_message>
<xml_diff>
--- a/doc/Keeping up with Rachel Appel and the Commodore.pptx
+++ b/doc/Keeping up with Rachel Appel and the Commodore.pptx
@@ -201,7 +201,7 @@
           <a:p>
             <a:fld id="{2B6DBF41-98D5-4B29-8B81-B31614D19ACC}" type="datetimeFigureOut">
               <a:rPr lang="en-US" smtClean="0"/>
-              <a:t>9/5/24</a:t>
+              <a:t>9/16/24</a:t>
             </a:fld>
             <a:endParaRPr lang="en-US"/>
           </a:p>
@@ -821,7 +821,7 @@
           <a:p>
             <a:fld id="{F9BC75CE-03FF-4667-898C-4C70B4392062}" type="datetimeFigureOut">
               <a:rPr lang="en-US" smtClean="0"/>
-              <a:t>9/5/24</a:t>
+              <a:t>9/16/24</a:t>
             </a:fld>
             <a:endParaRPr lang="en-US"/>
           </a:p>
@@ -1096,7 +1096,7 @@
           <a:p>
             <a:fld id="{F9BC75CE-03FF-4667-898C-4C70B4392062}" type="datetimeFigureOut">
               <a:rPr lang="en-US" smtClean="0"/>
-              <a:t>9/5/24</a:t>
+              <a:t>9/16/24</a:t>
             </a:fld>
             <a:endParaRPr lang="en-US"/>
           </a:p>
@@ -1290,7 +1290,7 @@
           <a:p>
             <a:fld id="{F9BC75CE-03FF-4667-898C-4C70B4392062}" type="datetimeFigureOut">
               <a:rPr lang="en-US" smtClean="0"/>
-              <a:t>9/5/24</a:t>
+              <a:t>9/16/24</a:t>
             </a:fld>
             <a:endParaRPr lang="en-US"/>
           </a:p>
@@ -1563,7 +1563,7 @@
           <a:p>
             <a:fld id="{F9BC75CE-03FF-4667-898C-4C70B4392062}" type="datetimeFigureOut">
               <a:rPr lang="en-US" smtClean="0"/>
-              <a:t>9/5/24</a:t>
+              <a:t>9/16/24</a:t>
             </a:fld>
             <a:endParaRPr lang="en-US"/>
           </a:p>
@@ -1904,7 +1904,7 @@
           <a:p>
             <a:fld id="{F9BC75CE-03FF-4667-898C-4C70B4392062}" type="datetimeFigureOut">
               <a:rPr lang="en-US" smtClean="0"/>
-              <a:t>9/5/24</a:t>
+              <a:t>9/16/24</a:t>
             </a:fld>
             <a:endParaRPr lang="en-US"/>
           </a:p>
@@ -2527,7 +2527,7 @@
           <a:p>
             <a:fld id="{F9BC75CE-03FF-4667-898C-4C70B4392062}" type="datetimeFigureOut">
               <a:rPr lang="en-US" smtClean="0"/>
-              <a:t>9/5/24</a:t>
+              <a:t>9/16/24</a:t>
             </a:fld>
             <a:endParaRPr lang="en-US"/>
           </a:p>
@@ -3387,7 +3387,7 @@
           <a:p>
             <a:fld id="{F9BC75CE-03FF-4667-898C-4C70B4392062}" type="datetimeFigureOut">
               <a:rPr lang="en-US" smtClean="0"/>
-              <a:t>9/5/24</a:t>
+              <a:t>9/16/24</a:t>
             </a:fld>
             <a:endParaRPr lang="en-US"/>
           </a:p>
@@ -3557,7 +3557,7 @@
           <a:p>
             <a:fld id="{F9BC75CE-03FF-4667-898C-4C70B4392062}" type="datetimeFigureOut">
               <a:rPr lang="en-US" smtClean="0"/>
-              <a:t>9/5/24</a:t>
+              <a:t>9/16/24</a:t>
             </a:fld>
             <a:endParaRPr lang="en-US"/>
           </a:p>
@@ -3737,7 +3737,7 @@
           <a:p>
             <a:fld id="{F9BC75CE-03FF-4667-898C-4C70B4392062}" type="datetimeFigureOut">
               <a:rPr lang="en-US" smtClean="0"/>
-              <a:t>9/5/24</a:t>
+              <a:t>9/16/24</a:t>
             </a:fld>
             <a:endParaRPr lang="en-US"/>
           </a:p>
@@ -4189,7 +4189,7 @@
           <a:p>
             <a:fld id="{F9BC75CE-03FF-4667-898C-4C70B4392062}" type="datetimeFigureOut">
               <a:rPr lang="en-US" smtClean="0"/>
-              <a:t>9/5/24</a:t>
+              <a:t>9/16/24</a:t>
             </a:fld>
             <a:endParaRPr lang="en-US"/>
           </a:p>
@@ -4241,6 +4241,272 @@
     <p:extLst>
       <p:ext uri="{BB962C8B-B14F-4D97-AF65-F5344CB8AC3E}">
         <p14:creationId xmlns:p14="http://schemas.microsoft.com/office/powerpoint/2010/main" val="942227312"/>
+      </p:ext>
+    </p:extLst>
+  </p:cSld>
+  <p:clrMapOvr>
+    <a:masterClrMapping/>
+  </p:clrMapOvr>
+</p:sldLayout>
+</file>
+
+<file path=ppt/slideLayouts/slideLayout20.xml><?xml version="1.0" encoding="utf-8"?>
+<p:sldLayout xmlns:a="http://schemas.openxmlformats.org/drawingml/2006/main" xmlns:r="http://schemas.openxmlformats.org/officeDocument/2006/relationships" xmlns:p="http://schemas.openxmlformats.org/presentationml/2006/main" preserve="1" userDrawn="1">
+  <p:cSld name="Commodore 64 Wide">
+    <p:bg>
+      <p:bgPr>
+        <a:blipFill dpi="0" rotWithShape="1">
+          <a:blip r:embed="rId2">
+            <a:lum/>
+          </a:blip>
+          <a:srcRect/>
+          <a:stretch>
+            <a:fillRect/>
+          </a:stretch>
+        </a:blipFill>
+        <a:effectLst/>
+      </p:bgPr>
+    </p:bg>
+    <p:spTree>
+      <p:nvGrpSpPr>
+        <p:cNvPr id="1" name=""/>
+        <p:cNvGrpSpPr/>
+        <p:nvPr/>
+      </p:nvGrpSpPr>
+      <p:grpSpPr>
+        <a:xfrm>
+          <a:off x="0" y="0"/>
+          <a:ext cx="0" cy="0"/>
+          <a:chOff x="0" y="0"/>
+          <a:chExt cx="0" cy="0"/>
+        </a:xfrm>
+      </p:grpSpPr>
+      <p:sp>
+        <p:nvSpPr>
+          <p:cNvPr id="2" name="Text Placeholder 5">
+            <a:extLst>
+              <a:ext uri="{FF2B5EF4-FFF2-40B4-BE49-F238E27FC236}">
+                <a16:creationId xmlns:a16="http://schemas.microsoft.com/office/drawing/2014/main" id="{928780C8-7426-4385-DEB0-BB693194F622}"/>
+              </a:ext>
+            </a:extLst>
+          </p:cNvPr>
+          <p:cNvSpPr>
+            <a:spLocks noGrp="1"/>
+          </p:cNvSpPr>
+          <p:nvPr>
+            <p:ph type="body" sz="quarter" idx="10" hasCustomPrompt="1"/>
+          </p:nvPr>
+        </p:nvSpPr>
+        <p:spPr>
+          <a:xfrm>
+            <a:off x="956582" y="840776"/>
+            <a:ext cx="10552793" cy="5176448"/>
+          </a:xfrm>
+          <a:prstGeom prst="rect">
+            <a:avLst/>
+          </a:prstGeom>
+        </p:spPr>
+        <p:txBody>
+          <a:bodyPr wrap="none"/>
+          <a:lstStyle>
+            <a:lvl1pPr marL="0" indent="0">
+              <a:lnSpc>
+                <a:spcPct val="88000"/>
+              </a:lnSpc>
+              <a:spcBef>
+                <a:spcPts val="0"/>
+              </a:spcBef>
+              <a:buNone/>
+              <a:defRPr sz="1500" baseline="0">
+                <a:solidFill>
+                  <a:srgbClr val="7385FF"/>
+                </a:solidFill>
+                <a:latin typeface="C64 Pro Mono" panose="02010609060202080101" pitchFamily="49" charset="77"/>
+              </a:defRPr>
+            </a:lvl1pPr>
+          </a:lstStyle>
+          <a:p>
+            <a:pPr lvl="0"/>
+            <a:r>
+              <a:rPr lang="en-US" dirty="0"/>
+              <a:t>Û123456789012345678901234567890123456789012345678901Û</a:t>
+            </a:r>
+          </a:p>
+          <a:p>
+            <a:pPr lvl="0"/>
+            <a:r>
+              <a:rPr lang="en-US" dirty="0"/>
+              <a:t>1</a:t>
+            </a:r>
+          </a:p>
+          <a:p>
+            <a:pPr lvl="0"/>
+            <a:r>
+              <a:rPr lang="en-US" dirty="0"/>
+              <a:t>2</a:t>
+            </a:r>
+          </a:p>
+          <a:p>
+            <a:pPr lvl="0"/>
+            <a:r>
+              <a:rPr lang="en-US" dirty="0"/>
+              <a:t>3</a:t>
+            </a:r>
+          </a:p>
+          <a:p>
+            <a:pPr lvl="0"/>
+            <a:r>
+              <a:rPr lang="en-US" dirty="0"/>
+              <a:t>4</a:t>
+            </a:r>
+          </a:p>
+          <a:p>
+            <a:pPr lvl="0"/>
+            <a:r>
+              <a:rPr lang="en-US" dirty="0"/>
+              <a:t>5</a:t>
+            </a:r>
+          </a:p>
+          <a:p>
+            <a:pPr lvl="0"/>
+            <a:r>
+              <a:rPr lang="en-US" dirty="0"/>
+              <a:t>6</a:t>
+            </a:r>
+          </a:p>
+          <a:p>
+            <a:pPr lvl="0"/>
+            <a:r>
+              <a:rPr lang="en-US" dirty="0"/>
+              <a:t>7</a:t>
+            </a:r>
+          </a:p>
+          <a:p>
+            <a:pPr lvl="0"/>
+            <a:r>
+              <a:rPr lang="en-US" dirty="0"/>
+              <a:t>8</a:t>
+            </a:r>
+          </a:p>
+          <a:p>
+            <a:pPr lvl="0"/>
+            <a:r>
+              <a:rPr lang="en-US" dirty="0"/>
+              <a:t>9</a:t>
+            </a:r>
+          </a:p>
+          <a:p>
+            <a:pPr lvl="0"/>
+            <a:r>
+              <a:rPr lang="en-US" dirty="0"/>
+              <a:t>0</a:t>
+            </a:r>
+          </a:p>
+          <a:p>
+            <a:pPr lvl="0"/>
+            <a:r>
+              <a:rPr lang="en-US" dirty="0"/>
+              <a:t>1</a:t>
+            </a:r>
+          </a:p>
+          <a:p>
+            <a:pPr lvl="0"/>
+            <a:r>
+              <a:rPr lang="en-US" dirty="0"/>
+              <a:t>2</a:t>
+            </a:r>
+          </a:p>
+          <a:p>
+            <a:pPr lvl="0"/>
+            <a:r>
+              <a:rPr lang="en-US" dirty="0"/>
+              <a:t>3</a:t>
+            </a:r>
+          </a:p>
+          <a:p>
+            <a:pPr lvl="0"/>
+            <a:r>
+              <a:rPr lang="en-US" dirty="0"/>
+              <a:t>4</a:t>
+            </a:r>
+          </a:p>
+          <a:p>
+            <a:pPr lvl="0"/>
+            <a:r>
+              <a:rPr lang="en-US" dirty="0"/>
+              <a:t>5</a:t>
+            </a:r>
+          </a:p>
+          <a:p>
+            <a:pPr lvl="0"/>
+            <a:r>
+              <a:rPr lang="en-US" dirty="0"/>
+              <a:t>6</a:t>
+            </a:r>
+          </a:p>
+          <a:p>
+            <a:pPr lvl="0"/>
+            <a:r>
+              <a:rPr lang="en-US" dirty="0"/>
+              <a:t>7</a:t>
+            </a:r>
+          </a:p>
+          <a:p>
+            <a:pPr lvl="0"/>
+            <a:r>
+              <a:rPr lang="en-US" dirty="0"/>
+              <a:t>8</a:t>
+            </a:r>
+          </a:p>
+          <a:p>
+            <a:pPr lvl="0"/>
+            <a:r>
+              <a:rPr lang="en-US" dirty="0"/>
+              <a:t>9</a:t>
+            </a:r>
+          </a:p>
+          <a:p>
+            <a:pPr lvl="0"/>
+            <a:r>
+              <a:rPr lang="en-US" dirty="0"/>
+              <a:t>0</a:t>
+            </a:r>
+          </a:p>
+          <a:p>
+            <a:pPr lvl="0"/>
+            <a:r>
+              <a:rPr lang="en-US" dirty="0"/>
+              <a:t>1</a:t>
+            </a:r>
+          </a:p>
+          <a:p>
+            <a:pPr lvl="0"/>
+            <a:r>
+              <a:rPr lang="en-US" dirty="0"/>
+              <a:t>2</a:t>
+            </a:r>
+          </a:p>
+          <a:p>
+            <a:pPr lvl="0"/>
+            <a:r>
+              <a:rPr lang="en-US" dirty="0"/>
+              <a:t>3</a:t>
+            </a:r>
+          </a:p>
+          <a:p>
+            <a:pPr lvl="0"/>
+            <a:r>
+              <a:rPr lang="en-US" dirty="0" err="1"/>
+              <a:t>Û</a:t>
+            </a:r>
+            <a:endParaRPr lang="en-US" dirty="0"/>
+          </a:p>
+        </p:txBody>
+      </p:sp>
+    </p:spTree>
+    <p:extLst>
+      <p:ext uri="{BB962C8B-B14F-4D97-AF65-F5344CB8AC3E}">
+        <p14:creationId xmlns:p14="http://schemas.microsoft.com/office/powerpoint/2010/main" val="4076804086"/>
       </p:ext>
     </p:extLst>
   </p:cSld>
@@ -4436,7 +4702,7 @@
           <a:p>
             <a:fld id="{F9BC75CE-03FF-4667-898C-4C70B4392062}" type="datetimeFigureOut">
               <a:rPr lang="en-US" smtClean="0"/>
-              <a:t>9/5/24</a:t>
+              <a:t>9/16/24</a:t>
             </a:fld>
             <a:endParaRPr lang="en-US"/>
           </a:p>
@@ -4728,7 +4994,7 @@
           <a:p>
             <a:fld id="{F9BC75CE-03FF-4667-898C-4C70B4392062}" type="datetimeFigureOut">
               <a:rPr lang="en-US" smtClean="0"/>
-              <a:t>9/5/24</a:t>
+              <a:t>9/16/24</a:t>
             </a:fld>
             <a:endParaRPr lang="en-US"/>
           </a:p>
@@ -5172,7 +5438,7 @@
           <a:p>
             <a:fld id="{F9BC75CE-03FF-4667-898C-4C70B4392062}" type="datetimeFigureOut">
               <a:rPr lang="en-US" smtClean="0"/>
-              <a:t>9/5/24</a:t>
+              <a:t>9/16/24</a:t>
             </a:fld>
             <a:endParaRPr lang="en-US"/>
           </a:p>
@@ -5290,7 +5556,7 @@
           <a:p>
             <a:fld id="{F9BC75CE-03FF-4667-898C-4C70B4392062}" type="datetimeFigureOut">
               <a:rPr lang="en-US" smtClean="0"/>
-              <a:t>9/5/24</a:t>
+              <a:t>9/16/24</a:t>
             </a:fld>
             <a:endParaRPr lang="en-US"/>
           </a:p>
@@ -5385,7 +5651,7 @@
           <a:p>
             <a:fld id="{F9BC75CE-03FF-4667-898C-4C70B4392062}" type="datetimeFigureOut">
               <a:rPr lang="en-US" smtClean="0"/>
-              <a:t>9/5/24</a:t>
+              <a:t>9/16/24</a:t>
             </a:fld>
             <a:endParaRPr lang="en-US"/>
           </a:p>
@@ -5664,7 +5930,7 @@
           <a:p>
             <a:fld id="{F9BC75CE-03FF-4667-898C-4C70B4392062}" type="datetimeFigureOut">
               <a:rPr lang="en-US" smtClean="0"/>
-              <a:t>9/5/24</a:t>
+              <a:t>9/16/24</a:t>
             </a:fld>
             <a:endParaRPr lang="en-US"/>
           </a:p>
@@ -5939,7 +6205,7 @@
           <a:p>
             <a:fld id="{F9BC75CE-03FF-4667-898C-4C70B4392062}" type="datetimeFigureOut">
               <a:rPr lang="en-US" smtClean="0"/>
-              <a:t>9/5/24</a:t>
+              <a:t>9/16/24</a:t>
             </a:fld>
             <a:endParaRPr lang="en-US"/>
           </a:p>
@@ -6368,7 +6634,7 @@
           <a:p>
             <a:fld id="{F9BC75CE-03FF-4667-898C-4C70B4392062}" type="datetimeFigureOut">
               <a:rPr lang="en-US" smtClean="0"/>
-              <a:t>9/5/24</a:t>
+              <a:t>9/16/24</a:t>
             </a:fld>
             <a:endParaRPr lang="en-US"/>
           </a:p>
@@ -7204,7 +7470,7 @@
     <p:bg>
       <p:bgPr>
         <a:blipFill dpi="0" rotWithShape="1">
-          <a:blip r:embed="rId3">
+          <a:blip r:embed="rId4">
             <a:lum/>
           </a:blip>
           <a:srcRect/>
@@ -7239,6 +7505,7 @@
   <p:clrMap bg1="lt1" tx1="dk1" bg2="lt2" tx2="dk2" accent1="accent1" accent2="accent2" accent3="accent3" accent4="accent4" accent5="accent5" accent6="accent6" hlink="hlink" folHlink="folHlink"/>
   <p:sldLayoutIdLst>
     <p:sldLayoutId id="2147483680" r:id="rId1"/>
+    <p:sldLayoutId id="2147483681" r:id="rId2"/>
   </p:sldLayoutIdLst>
   <p:txStyles>
     <p:titleStyle>

</xml_diff>

<commit_message>
Added sections for opening and closing
</commit_message>
<xml_diff>
--- a/doc/Keeping up with Rachel Appel and the Commodore.pptx
+++ b/doc/Keeping up with Rachel Appel and the Commodore.pptx
@@ -7,12 +7,14 @@
     <p:sldMasterId id="2147483678" r:id="rId3"/>
   </p:sldMasterIdLst>
   <p:notesMasterIdLst>
-    <p:notesMasterId r:id="rId7"/>
+    <p:notesMasterId r:id="rId9"/>
   </p:notesMasterIdLst>
   <p:sldIdLst>
     <p:sldId id="256" r:id="rId4"/>
     <p:sldId id="322" r:id="rId5"/>
-    <p:sldId id="321" r:id="rId6"/>
+    <p:sldId id="323" r:id="rId6"/>
+    <p:sldId id="284" r:id="rId7"/>
+    <p:sldId id="321" r:id="rId8"/>
   </p:sldIdLst>
   <p:sldSz cx="12192000" cy="6858000"/>
   <p:notesSz cx="6858000" cy="9144000"/>
@@ -112,6 +114,27 @@
     </a:lvl9pPr>
   </p:defaultTextStyle>
   <p:extLst>
+    <p:ext uri="{521415D9-36F7-43E2-AB2F-B90AF26B5E84}">
+      <p14:sectionLst xmlns:p14="http://schemas.microsoft.com/office/powerpoint/2010/main">
+        <p14:section name="Opening" id="{0847C7B7-3BF0-6540-8CF4-D15D8C8325FD}">
+          <p14:sldIdLst>
+            <p14:sldId id="256"/>
+            <p14:sldId id="322"/>
+          </p14:sldIdLst>
+        </p14:section>
+        <p14:section name="Lessons of Hanoi" id="{214A05DB-D7E7-7645-8AF9-C2AA1A46C829}">
+          <p14:sldIdLst>
+            <p14:sldId id="323"/>
+          </p14:sldIdLst>
+        </p14:section>
+        <p14:section name="Closing" id="{BC0C0282-AF9F-204E-9951-7490FA39258D}">
+          <p14:sldIdLst>
+            <p14:sldId id="284"/>
+            <p14:sldId id="321"/>
+          </p14:sldIdLst>
+        </p14:section>
+      </p14:sectionLst>
+    </p:ext>
     <p:ext uri="{EFAFB233-063F-42B5-8137-9DF3F51BA10A}">
       <p15:sldGuideLst xmlns:p15="http://schemas.microsoft.com/office/powerpoint/2012/main"/>
     </p:ext>
@@ -201,7 +224,7 @@
           <a:p>
             <a:fld id="{2B6DBF41-98D5-4B29-8B81-B31614D19ACC}" type="datetimeFigureOut">
               <a:rPr lang="en-US" smtClean="0"/>
-              <a:t>10/4/24</a:t>
+              <a:t>1/28/25</a:t>
             </a:fld>
             <a:endParaRPr lang="en-US"/>
           </a:p>
@@ -821,7 +844,7 @@
           <a:p>
             <a:fld id="{F9BC75CE-03FF-4667-898C-4C70B4392062}" type="datetimeFigureOut">
               <a:rPr lang="en-US" smtClean="0"/>
-              <a:t>10/4/24</a:t>
+              <a:t>1/28/25</a:t>
             </a:fld>
             <a:endParaRPr lang="en-US"/>
           </a:p>
@@ -1096,7 +1119,7 @@
           <a:p>
             <a:fld id="{F9BC75CE-03FF-4667-898C-4C70B4392062}" type="datetimeFigureOut">
               <a:rPr lang="en-US" smtClean="0"/>
-              <a:t>10/4/24</a:t>
+              <a:t>1/28/25</a:t>
             </a:fld>
             <a:endParaRPr lang="en-US"/>
           </a:p>
@@ -1290,7 +1313,7 @@
           <a:p>
             <a:fld id="{F9BC75CE-03FF-4667-898C-4C70B4392062}" type="datetimeFigureOut">
               <a:rPr lang="en-US" smtClean="0"/>
-              <a:t>10/4/24</a:t>
+              <a:t>1/28/25</a:t>
             </a:fld>
             <a:endParaRPr lang="en-US"/>
           </a:p>
@@ -1563,7 +1586,7 @@
           <a:p>
             <a:fld id="{F9BC75CE-03FF-4667-898C-4C70B4392062}" type="datetimeFigureOut">
               <a:rPr lang="en-US" smtClean="0"/>
-              <a:t>10/4/24</a:t>
+              <a:t>1/28/25</a:t>
             </a:fld>
             <a:endParaRPr lang="en-US"/>
           </a:p>
@@ -1904,7 +1927,7 @@
           <a:p>
             <a:fld id="{F9BC75CE-03FF-4667-898C-4C70B4392062}" type="datetimeFigureOut">
               <a:rPr lang="en-US" smtClean="0"/>
-              <a:t>10/4/24</a:t>
+              <a:t>1/28/25</a:t>
             </a:fld>
             <a:endParaRPr lang="en-US"/>
           </a:p>
@@ -2527,7 +2550,7 @@
           <a:p>
             <a:fld id="{F9BC75CE-03FF-4667-898C-4C70B4392062}" type="datetimeFigureOut">
               <a:rPr lang="en-US" smtClean="0"/>
-              <a:t>10/4/24</a:t>
+              <a:t>1/28/25</a:t>
             </a:fld>
             <a:endParaRPr lang="en-US"/>
           </a:p>
@@ -3387,7 +3410,7 @@
           <a:p>
             <a:fld id="{F9BC75CE-03FF-4667-898C-4C70B4392062}" type="datetimeFigureOut">
               <a:rPr lang="en-US" smtClean="0"/>
-              <a:t>10/4/24</a:t>
+              <a:t>1/28/25</a:t>
             </a:fld>
             <a:endParaRPr lang="en-US"/>
           </a:p>
@@ -3557,7 +3580,7 @@
           <a:p>
             <a:fld id="{F9BC75CE-03FF-4667-898C-4C70B4392062}" type="datetimeFigureOut">
               <a:rPr lang="en-US" smtClean="0"/>
-              <a:t>10/4/24</a:t>
+              <a:t>1/28/25</a:t>
             </a:fld>
             <a:endParaRPr lang="en-US"/>
           </a:p>
@@ -3737,7 +3760,7 @@
           <a:p>
             <a:fld id="{F9BC75CE-03FF-4667-898C-4C70B4392062}" type="datetimeFigureOut">
               <a:rPr lang="en-US" smtClean="0"/>
-              <a:t>10/4/24</a:t>
+              <a:t>1/28/25</a:t>
             </a:fld>
             <a:endParaRPr lang="en-US"/>
           </a:p>
@@ -4189,7 +4212,7 @@
           <a:p>
             <a:fld id="{F9BC75CE-03FF-4667-898C-4C70B4392062}" type="datetimeFigureOut">
               <a:rPr lang="en-US" smtClean="0"/>
-              <a:t>10/4/24</a:t>
+              <a:t>1/28/25</a:t>
             </a:fld>
             <a:endParaRPr lang="en-US"/>
           </a:p>
@@ -4702,7 +4725,7 @@
           <a:p>
             <a:fld id="{F9BC75CE-03FF-4667-898C-4C70B4392062}" type="datetimeFigureOut">
               <a:rPr lang="en-US" smtClean="0"/>
-              <a:t>10/4/24</a:t>
+              <a:t>1/28/25</a:t>
             </a:fld>
             <a:endParaRPr lang="en-US"/>
           </a:p>
@@ -4994,7 +5017,7 @@
           <a:p>
             <a:fld id="{F9BC75CE-03FF-4667-898C-4C70B4392062}" type="datetimeFigureOut">
               <a:rPr lang="en-US" smtClean="0"/>
-              <a:t>10/4/24</a:t>
+              <a:t>1/28/25</a:t>
             </a:fld>
             <a:endParaRPr lang="en-US"/>
           </a:p>
@@ -5438,7 +5461,7 @@
           <a:p>
             <a:fld id="{F9BC75CE-03FF-4667-898C-4C70B4392062}" type="datetimeFigureOut">
               <a:rPr lang="en-US" smtClean="0"/>
-              <a:t>10/4/24</a:t>
+              <a:t>1/28/25</a:t>
             </a:fld>
             <a:endParaRPr lang="en-US"/>
           </a:p>
@@ -5556,7 +5579,7 @@
           <a:p>
             <a:fld id="{F9BC75CE-03FF-4667-898C-4C70B4392062}" type="datetimeFigureOut">
               <a:rPr lang="en-US" smtClean="0"/>
-              <a:t>10/4/24</a:t>
+              <a:t>1/28/25</a:t>
             </a:fld>
             <a:endParaRPr lang="en-US"/>
           </a:p>
@@ -5651,7 +5674,7 @@
           <a:p>
             <a:fld id="{F9BC75CE-03FF-4667-898C-4C70B4392062}" type="datetimeFigureOut">
               <a:rPr lang="en-US" smtClean="0"/>
-              <a:t>10/4/24</a:t>
+              <a:t>1/28/25</a:t>
             </a:fld>
             <a:endParaRPr lang="en-US"/>
           </a:p>
@@ -5930,7 +5953,7 @@
           <a:p>
             <a:fld id="{F9BC75CE-03FF-4667-898C-4C70B4392062}" type="datetimeFigureOut">
               <a:rPr lang="en-US" smtClean="0"/>
-              <a:t>10/4/24</a:t>
+              <a:t>1/28/25</a:t>
             </a:fld>
             <a:endParaRPr lang="en-US"/>
           </a:p>
@@ -6205,7 +6228,7 @@
           <a:p>
             <a:fld id="{F9BC75CE-03FF-4667-898C-4C70B4392062}" type="datetimeFigureOut">
               <a:rPr lang="en-US" smtClean="0"/>
-              <a:t>10/4/24</a:t>
+              <a:t>1/28/25</a:t>
             </a:fld>
             <a:endParaRPr lang="en-US"/>
           </a:p>
@@ -6634,7 +6657,7 @@
           <a:p>
             <a:fld id="{F9BC75CE-03FF-4667-898C-4C70B4392062}" type="datetimeFigureOut">
               <a:rPr lang="en-US" smtClean="0"/>
-              <a:t>10/4/24</a:t>
+              <a:t>1/28/25</a:t>
             </a:fld>
             <a:endParaRPr lang="en-US"/>
           </a:p>
@@ -8404,7 +8427,7 @@
           <a:p>
             <a:r>
               <a:rPr lang="en-US" sz="1200" dirty="0"/>
-              <a:t>Rev. 1 (2024-10-??), </a:t>
+              <a:t>Rev. 1 (2025-??-??), </a:t>
             </a:r>
             <a:r>
               <a:rPr lang="en-US" sz="1200" dirty="0">
@@ -8777,7 +8800,7 @@
   <p:clrMapOvr>
     <a:masterClrMapping/>
   </p:clrMapOvr>
-  <p:transition>
+  <p:transition spd="slow">
     <p:dissolve/>
   </p:transition>
   <p:timing>
@@ -8920,6 +8943,511 @@
           <a:chExt cx="0" cy="0"/>
         </a:xfrm>
       </p:grpSpPr>
+      <p:sp>
+        <p:nvSpPr>
+          <p:cNvPr id="2" name="Text Placeholder 1">
+            <a:extLst>
+              <a:ext uri="{FF2B5EF4-FFF2-40B4-BE49-F238E27FC236}">
+                <a16:creationId xmlns:a16="http://schemas.microsoft.com/office/drawing/2014/main" id="{F3D613F6-2844-9C5E-9047-5D5AE4688063}"/>
+              </a:ext>
+            </a:extLst>
+          </p:cNvPr>
+          <p:cNvSpPr>
+            <a:spLocks noGrp="1"/>
+          </p:cNvSpPr>
+          <p:nvPr>
+            <p:ph type="body" sz="quarter" idx="10"/>
+          </p:nvPr>
+        </p:nvSpPr>
+        <p:spPr/>
+        <p:txBody>
+          <a:bodyPr/>
+          <a:lstStyle/>
+          <a:p>
+            <a:endParaRPr lang="en-US" dirty="0"/>
+          </a:p>
+          <a:p>
+            <a:r>
+              <a:rPr lang="en-US" dirty="0"/>
+              <a:t>            Lessons of Hanoi</a:t>
+            </a:r>
+          </a:p>
+        </p:txBody>
+      </p:sp>
+    </p:spTree>
+    <p:extLst>
+      <p:ext uri="{BB962C8B-B14F-4D97-AF65-F5344CB8AC3E}">
+        <p14:creationId xmlns:p14="http://schemas.microsoft.com/office/powerpoint/2010/main" val="2765490107"/>
+      </p:ext>
+    </p:extLst>
+  </p:cSld>
+  <p:clrMapOvr>
+    <a:masterClrMapping/>
+  </p:clrMapOvr>
+</p:sld>
+</file>
+
+<file path=ppt/slides/slide4.xml><?xml version="1.0" encoding="utf-8"?>
+<p:sld xmlns:a="http://schemas.openxmlformats.org/drawingml/2006/main" xmlns:r="http://schemas.openxmlformats.org/officeDocument/2006/relationships" xmlns:p="http://schemas.openxmlformats.org/presentationml/2006/main">
+  <p:cSld>
+    <p:spTree>
+      <p:nvGrpSpPr>
+        <p:cNvPr id="1" name=""/>
+        <p:cNvGrpSpPr/>
+        <p:nvPr/>
+      </p:nvGrpSpPr>
+      <p:grpSpPr>
+        <a:xfrm>
+          <a:off x="0" y="0"/>
+          <a:ext cx="0" cy="0"/>
+          <a:chOff x="0" y="0"/>
+          <a:chExt cx="0" cy="0"/>
+        </a:xfrm>
+      </p:grpSpPr>
+      <p:sp>
+        <p:nvSpPr>
+          <p:cNvPr id="2" name="Title 1">
+            <a:extLst>
+              <a:ext uri="{FF2B5EF4-FFF2-40B4-BE49-F238E27FC236}">
+                <a16:creationId xmlns:a16="http://schemas.microsoft.com/office/drawing/2014/main" id="{7306C212-B3B4-8E92-B9B3-B626EF37EBA4}"/>
+              </a:ext>
+            </a:extLst>
+          </p:cNvPr>
+          <p:cNvSpPr txBox="1">
+            <a:spLocks noGrp="1"/>
+          </p:cNvSpPr>
+          <p:nvPr>
+            <p:ph type="title" idx="4294967295"/>
+          </p:nvPr>
+        </p:nvSpPr>
+        <p:spPr>
+          <a:xfrm>
+            <a:off x="1061794" y="2828836"/>
+            <a:ext cx="10068412" cy="1200329"/>
+          </a:xfrm>
+          <a:prstGeom prst="rect">
+            <a:avLst/>
+          </a:prstGeom>
+          <a:noFill/>
+          <a:ln>
+            <a:noFill/>
+            <a:prstDash/>
+          </a:ln>
+          <a:effectLst/>
+        </p:spPr>
+        <p:txBody>
+          <a:bodyPr rot="0" spcFirstLastPara="0" vertOverflow="overflow" horzOverflow="overflow" vert="horz" wrap="square" lIns="91440" tIns="45720" rIns="91440" bIns="45720" numCol="1" spcCol="0" rtlCol="0" fromWordArt="0" anchor="t" anchorCtr="0" forceAA="0" compatLnSpc="1">
+            <a:prstTxWarp prst="textNoShape">
+              <a:avLst/>
+            </a:prstTxWarp>
+            <a:spAutoFit/>
+          </a:bodyPr>
+          <a:lstStyle/>
+          <a:p>
+            <a:pPr marL="0" marR="0" lvl="0" indent="0" algn="ctr" defTabSz="457200" rtl="0" eaLnBrk="1" fontAlgn="auto" latinLnBrk="0" hangingPunct="1">
+              <a:lnSpc>
+                <a:spcPct val="100000"/>
+              </a:lnSpc>
+              <a:spcBef>
+                <a:spcPts val="0"/>
+              </a:spcBef>
+              <a:spcAft>
+                <a:spcPts val="0"/>
+              </a:spcAft>
+              <a:buClrTx/>
+              <a:buSzTx/>
+              <a:buFontTx/>
+              <a:buNone/>
+              <a:tabLst/>
+              <a:defRPr/>
+            </a:pPr>
+            <a:r>
+              <a:rPr kumimoji="0" lang="en-US" sz="7200" b="0" i="0" u="none" strike="noStrike" kern="1200" cap="none" spc="0" normalizeH="0" baseline="0" noProof="0" dirty="0">
+                <a:ln>
+                  <a:noFill/>
+                </a:ln>
+                <a:solidFill>
+                  <a:schemeClr val="tx1"/>
+                </a:solidFill>
+                <a:effectLst/>
+                <a:uLnTx/>
+                <a:uFillTx/>
+                <a:latin typeface="+mn-lt"/>
+                <a:ea typeface="+mn-ea"/>
+                <a:cs typeface="+mn-cs"/>
+              </a:rPr>
+              <a:t>Questions?</a:t>
+            </a:r>
+          </a:p>
+        </p:txBody>
+      </p:sp>
+      <p:pic>
+        <p:nvPicPr>
+          <p:cNvPr id="9" name="Picture 8" descr="GitHub">
+            <a:extLst>
+              <a:ext uri="{FF2B5EF4-FFF2-40B4-BE49-F238E27FC236}">
+                <a16:creationId xmlns:a16="http://schemas.microsoft.com/office/drawing/2014/main" id="{D413AEAD-8A92-6186-D075-5F3D3F946656}"/>
+              </a:ext>
+            </a:extLst>
+          </p:cNvPr>
+          <p:cNvPicPr>
+            <a:picLocks noChangeAspect="1"/>
+          </p:cNvPicPr>
+          <p:nvPr/>
+        </p:nvPicPr>
+        <p:blipFill>
+          <a:blip r:embed="rId2">
+            <a:extLst>
+              <a:ext uri="{28A0092B-C50C-407E-A947-70E740481C1C}">
+                <a14:useLocalDpi xmlns:a14="http://schemas.microsoft.com/office/drawing/2010/main" val="0"/>
+              </a:ext>
+            </a:extLst>
+          </a:blip>
+          <a:stretch>
+            <a:fillRect/>
+          </a:stretch>
+        </p:blipFill>
+        <p:spPr>
+          <a:xfrm>
+            <a:off x="457200" y="5303520"/>
+            <a:ext cx="274320" cy="274320"/>
+          </a:xfrm>
+          <a:prstGeom prst="rect">
+            <a:avLst/>
+          </a:prstGeom>
+        </p:spPr>
+      </p:pic>
+      <p:sp>
+        <p:nvSpPr>
+          <p:cNvPr id="10" name="TextBox 9">
+            <a:extLst>
+              <a:ext uri="{FF2B5EF4-FFF2-40B4-BE49-F238E27FC236}">
+                <a16:creationId xmlns:a16="http://schemas.microsoft.com/office/drawing/2014/main" id="{888E3480-3A92-8D18-6D43-A59A2C6A1260}"/>
+              </a:ext>
+            </a:extLst>
+          </p:cNvPr>
+          <p:cNvSpPr txBox="1"/>
+          <p:nvPr/>
+        </p:nvSpPr>
+        <p:spPr>
+          <a:xfrm>
+            <a:off x="800098" y="5247459"/>
+            <a:ext cx="3457641" cy="400110"/>
+          </a:xfrm>
+          <a:prstGeom prst="rect">
+            <a:avLst/>
+          </a:prstGeom>
+          <a:noFill/>
+        </p:spPr>
+        <p:txBody>
+          <a:bodyPr wrap="square" rtlCol="0">
+            <a:spAutoFit/>
+          </a:bodyPr>
+          <a:lstStyle/>
+          <a:p>
+            <a:pPr marL="0" marR="0" lvl="0" indent="0" algn="l" defTabSz="457200" rtl="0" eaLnBrk="1" fontAlgn="auto" latinLnBrk="0" hangingPunct="1">
+              <a:lnSpc>
+                <a:spcPct val="100000"/>
+              </a:lnSpc>
+              <a:spcBef>
+                <a:spcPts val="0"/>
+              </a:spcBef>
+              <a:spcAft>
+                <a:spcPts val="0"/>
+              </a:spcAft>
+              <a:buClrTx/>
+              <a:buSzTx/>
+              <a:buFontTx/>
+              <a:buNone/>
+              <a:tabLst/>
+              <a:defRPr/>
+            </a:pPr>
+            <a:r>
+              <a:rPr kumimoji="0" lang="en-US" sz="2000" b="0" i="0" u="none" strike="noStrike" kern="1200" cap="none" spc="0" normalizeH="0" baseline="0" noProof="0" dirty="0" err="1">
+                <a:ln>
+                  <a:noFill/>
+                </a:ln>
+                <a:solidFill>
+                  <a:prstClr val="white"/>
+                </a:solidFill>
+                <a:effectLst/>
+                <a:uLnTx/>
+                <a:uFillTx/>
+                <a:latin typeface="Century Gothic" panose="020B0502020202020204"/>
+                <a:ea typeface="+mn-ea"/>
+                <a:cs typeface="+mn-cs"/>
+              </a:rPr>
+              <a:t>dennisdietrich</a:t>
+            </a:r>
+            <a:endParaRPr kumimoji="0" lang="en-US" sz="2000" b="0" i="0" u="none" strike="noStrike" kern="1200" cap="none" spc="0" normalizeH="0" baseline="0" noProof="0" dirty="0">
+              <a:ln>
+                <a:noFill/>
+              </a:ln>
+              <a:solidFill>
+                <a:prstClr val="white"/>
+              </a:solidFill>
+              <a:effectLst/>
+              <a:uLnTx/>
+              <a:uFillTx/>
+              <a:latin typeface="Century Gothic" panose="020B0502020202020204"/>
+              <a:ea typeface="+mn-ea"/>
+              <a:cs typeface="+mn-cs"/>
+            </a:endParaRPr>
+          </a:p>
+        </p:txBody>
+      </p:sp>
+      <p:pic>
+        <p:nvPicPr>
+          <p:cNvPr id="11" name="Picture 10" descr="LinkedIn">
+            <a:extLst>
+              <a:ext uri="{FF2B5EF4-FFF2-40B4-BE49-F238E27FC236}">
+                <a16:creationId xmlns:a16="http://schemas.microsoft.com/office/drawing/2014/main" id="{5498B0FC-EAA9-1A93-9862-02CC73B5EEE3}"/>
+              </a:ext>
+            </a:extLst>
+          </p:cNvPr>
+          <p:cNvPicPr>
+            <a:picLocks noChangeAspect="1"/>
+          </p:cNvPicPr>
+          <p:nvPr/>
+        </p:nvPicPr>
+        <p:blipFill>
+          <a:blip r:embed="rId3">
+            <a:extLst>
+              <a:ext uri="{28A0092B-C50C-407E-A947-70E740481C1C}">
+                <a14:useLocalDpi xmlns:a14="http://schemas.microsoft.com/office/drawing/2010/main" val="0"/>
+              </a:ext>
+            </a:extLst>
+          </a:blip>
+          <a:stretch>
+            <a:fillRect/>
+          </a:stretch>
+        </p:blipFill>
+        <p:spPr>
+          <a:xfrm>
+            <a:off x="457200" y="5715000"/>
+            <a:ext cx="274320" cy="274320"/>
+          </a:xfrm>
+          <a:prstGeom prst="rect">
+            <a:avLst/>
+          </a:prstGeom>
+        </p:spPr>
+      </p:pic>
+      <p:sp>
+        <p:nvSpPr>
+          <p:cNvPr id="12" name="TextBox 11">
+            <a:extLst>
+              <a:ext uri="{FF2B5EF4-FFF2-40B4-BE49-F238E27FC236}">
+                <a16:creationId xmlns:a16="http://schemas.microsoft.com/office/drawing/2014/main" id="{E80021A4-348A-BF7C-63BF-6C89D7630DCC}"/>
+              </a:ext>
+            </a:extLst>
+          </p:cNvPr>
+          <p:cNvSpPr txBox="1"/>
+          <p:nvPr/>
+        </p:nvSpPr>
+        <p:spPr>
+          <a:xfrm>
+            <a:off x="800099" y="5664321"/>
+            <a:ext cx="3457641" cy="400110"/>
+          </a:xfrm>
+          <a:prstGeom prst="rect">
+            <a:avLst/>
+          </a:prstGeom>
+          <a:noFill/>
+        </p:spPr>
+        <p:txBody>
+          <a:bodyPr wrap="square" rtlCol="0">
+            <a:spAutoFit/>
+          </a:bodyPr>
+          <a:lstStyle/>
+          <a:p>
+            <a:pPr marL="0" marR="0" lvl="0" indent="0" algn="l" defTabSz="457200" rtl="0" eaLnBrk="1" fontAlgn="auto" latinLnBrk="0" hangingPunct="1">
+              <a:lnSpc>
+                <a:spcPct val="100000"/>
+              </a:lnSpc>
+              <a:spcBef>
+                <a:spcPts val="0"/>
+              </a:spcBef>
+              <a:spcAft>
+                <a:spcPts val="0"/>
+              </a:spcAft>
+              <a:buClrTx/>
+              <a:buSzTx/>
+              <a:buFontTx/>
+              <a:buNone/>
+              <a:tabLst/>
+              <a:defRPr/>
+            </a:pPr>
+            <a:r>
+              <a:rPr kumimoji="0" lang="en-US" sz="2000" b="0" i="0" u="none" strike="noStrike" kern="1200" cap="none" spc="0" normalizeH="0" baseline="0" noProof="0" dirty="0" err="1">
+                <a:ln>
+                  <a:noFill/>
+                </a:ln>
+                <a:solidFill>
+                  <a:prstClr val="white"/>
+                </a:solidFill>
+                <a:effectLst/>
+                <a:uLnTx/>
+                <a:uFillTx/>
+                <a:latin typeface="Century Gothic" panose="020B0502020202020204"/>
+                <a:ea typeface="+mn-ea"/>
+                <a:cs typeface="+mn-cs"/>
+              </a:rPr>
+              <a:t>dcdietrich</a:t>
+            </a:r>
+            <a:endParaRPr kumimoji="0" lang="en-US" sz="2000" b="0" i="0" u="none" strike="noStrike" kern="1200" cap="none" spc="0" normalizeH="0" baseline="0" noProof="0" dirty="0">
+              <a:ln>
+                <a:noFill/>
+              </a:ln>
+              <a:solidFill>
+                <a:prstClr val="white"/>
+              </a:solidFill>
+              <a:effectLst/>
+              <a:uLnTx/>
+              <a:uFillTx/>
+              <a:latin typeface="Century Gothic" panose="020B0502020202020204"/>
+              <a:ea typeface="+mn-ea"/>
+              <a:cs typeface="+mn-cs"/>
+            </a:endParaRPr>
+          </a:p>
+        </p:txBody>
+      </p:sp>
+      <p:pic>
+        <p:nvPicPr>
+          <p:cNvPr id="13" name="Graphic 12" descr="Mastodon">
+            <a:extLst>
+              <a:ext uri="{FF2B5EF4-FFF2-40B4-BE49-F238E27FC236}">
+                <a16:creationId xmlns:a16="http://schemas.microsoft.com/office/drawing/2014/main" id="{DCED133C-A505-FBA4-FD79-26B84EFC1909}"/>
+              </a:ext>
+            </a:extLst>
+          </p:cNvPr>
+          <p:cNvPicPr>
+            <a:picLocks noChangeAspect="1"/>
+          </p:cNvPicPr>
+          <p:nvPr/>
+        </p:nvPicPr>
+        <p:blipFill>
+          <a:blip r:embed="rId4">
+            <a:extLst>
+              <a:ext uri="{28A0092B-C50C-407E-A947-70E740481C1C}">
+                <a14:useLocalDpi xmlns:a14="http://schemas.microsoft.com/office/drawing/2010/main" val="0"/>
+              </a:ext>
+              <a:ext uri="{96DAC541-7B7A-43D3-8B79-37D633B846F1}">
+                <asvg:svgBlip xmlns:asvg="http://schemas.microsoft.com/office/drawing/2016/SVG/main" r:embed="rId5"/>
+              </a:ext>
+            </a:extLst>
+          </a:blip>
+          <a:stretch>
+            <a:fillRect/>
+          </a:stretch>
+        </p:blipFill>
+        <p:spPr>
+          <a:xfrm>
+            <a:off x="457200" y="6126480"/>
+            <a:ext cx="274320" cy="292855"/>
+          </a:xfrm>
+          <a:prstGeom prst="rect">
+            <a:avLst/>
+          </a:prstGeom>
+        </p:spPr>
+      </p:pic>
+      <p:sp>
+        <p:nvSpPr>
+          <p:cNvPr id="14" name="TextBox 13">
+            <a:extLst>
+              <a:ext uri="{FF2B5EF4-FFF2-40B4-BE49-F238E27FC236}">
+                <a16:creationId xmlns:a16="http://schemas.microsoft.com/office/drawing/2014/main" id="{E5813634-0CE6-B509-5B60-E9061F6A69C4}"/>
+              </a:ext>
+            </a:extLst>
+          </p:cNvPr>
+          <p:cNvSpPr txBox="1"/>
+          <p:nvPr/>
+        </p:nvSpPr>
+        <p:spPr>
+          <a:xfrm>
+            <a:off x="800100" y="6064431"/>
+            <a:ext cx="5935551" cy="400110"/>
+          </a:xfrm>
+          <a:prstGeom prst="rect">
+            <a:avLst/>
+          </a:prstGeom>
+          <a:noFill/>
+        </p:spPr>
+        <p:txBody>
+          <a:bodyPr wrap="square" rtlCol="0">
+            <a:spAutoFit/>
+          </a:bodyPr>
+          <a:lstStyle/>
+          <a:p>
+            <a:pPr marL="0" marR="0" lvl="0" indent="0" algn="l" defTabSz="457200" rtl="0" eaLnBrk="1" fontAlgn="auto" latinLnBrk="0" hangingPunct="1">
+              <a:lnSpc>
+                <a:spcPct val="100000"/>
+              </a:lnSpc>
+              <a:spcBef>
+                <a:spcPts val="0"/>
+              </a:spcBef>
+              <a:spcAft>
+                <a:spcPts val="0"/>
+              </a:spcAft>
+              <a:buClrTx/>
+              <a:buSzTx/>
+              <a:buFontTx/>
+              <a:buNone/>
+              <a:tabLst/>
+              <a:defRPr/>
+            </a:pPr>
+            <a:r>
+              <a:rPr kumimoji="0" lang="en-US" sz="2000" b="0" i="0" u="none" strike="noStrike" kern="1200" cap="none" spc="0" normalizeH="0" baseline="0" noProof="0" dirty="0">
+                <a:ln>
+                  <a:noFill/>
+                </a:ln>
+                <a:solidFill>
+                  <a:prstClr val="white"/>
+                </a:solidFill>
+                <a:effectLst/>
+                <a:uLnTx/>
+                <a:uFillTx/>
+                <a:latin typeface="Century Gothic" panose="020B0502020202020204"/>
+                <a:ea typeface="+mn-ea"/>
+                <a:cs typeface="+mn-cs"/>
+              </a:rPr>
+              <a:t>@dc@social.advancedsoftware.engineering</a:t>
+            </a:r>
+          </a:p>
+        </p:txBody>
+      </p:sp>
+    </p:spTree>
+    <p:extLst>
+      <p:ext uri="{BB962C8B-B14F-4D97-AF65-F5344CB8AC3E}">
+        <p14:creationId xmlns:p14="http://schemas.microsoft.com/office/powerpoint/2010/main" val="1870771211"/>
+      </p:ext>
+    </p:extLst>
+  </p:cSld>
+  <p:clrMapOvr>
+    <a:masterClrMapping/>
+  </p:clrMapOvr>
+  <p:transition spd="slow">
+    <p:dissolve/>
+  </p:transition>
+</p:sld>
+</file>
+
+<file path=ppt/slides/slide5.xml><?xml version="1.0" encoding="utf-8"?>
+<p:sld xmlns:a="http://schemas.openxmlformats.org/drawingml/2006/main" xmlns:r="http://schemas.openxmlformats.org/officeDocument/2006/relationships" xmlns:p="http://schemas.openxmlformats.org/presentationml/2006/main">
+  <p:cSld>
+    <p:spTree>
+      <p:nvGrpSpPr>
+        <p:cNvPr id="1" name=""/>
+        <p:cNvGrpSpPr/>
+        <p:nvPr/>
+      </p:nvGrpSpPr>
+      <p:grpSpPr>
+        <a:xfrm>
+          <a:off x="0" y="0"/>
+          <a:ext cx="0" cy="0"/>
+          <a:chOff x="0" y="0"/>
+          <a:chExt cx="0" cy="0"/>
+        </a:xfrm>
+      </p:grpSpPr>
       <p:pic>
         <p:nvPicPr>
           <p:cNvPr id="11" name="Picture 10" descr="A qr code on a white background&#10;&#10;Description automatically generated">
@@ -9261,9 +9789,6 @@
   <p:clrMapOvr>
     <a:masterClrMapping/>
   </p:clrMapOvr>
-  <p:transition>
-    <p:dissolve/>
-  </p:transition>
   <p:timing>
     <p:tnLst>
       <p:par>

</xml_diff>